<commit_message>
fig update plus M O R E D A T A
</commit_message>
<xml_diff>
--- a/figuresProj.pptx
+++ b/figuresProj.pptx
@@ -104,6 +104,11 @@
       </a:defRPr>
     </a:lvl9pPr>
   </p:defaultTextStyle>
+  <p:extLst>
+    <p:ext uri="{EFAFB233-063F-42B5-8137-9DF3F51BA10A}">
+      <p15:sldGuideLst xmlns:p15="http://schemas.microsoft.com/office/powerpoint/2012/main"/>
+    </p:ext>
+  </p:extLst>
 </p:presentation>
 </file>
 
@@ -254,7 +259,7 @@
           <a:p>
             <a:fld id="{3FB6DB27-A4FB-6249-AA29-84868FD7983F}" type="datetimeFigureOut">
               <a:rPr lang="en-US" smtClean="0"/>
-              <a:t>5/14/21</a:t>
+              <a:t>5/18/21</a:t>
             </a:fld>
             <a:endParaRPr lang="en-US"/>
           </a:p>
@@ -452,7 +457,7 @@
           <a:p>
             <a:fld id="{3FB6DB27-A4FB-6249-AA29-84868FD7983F}" type="datetimeFigureOut">
               <a:rPr lang="en-US" smtClean="0"/>
-              <a:t>5/14/21</a:t>
+              <a:t>5/18/21</a:t>
             </a:fld>
             <a:endParaRPr lang="en-US"/>
           </a:p>
@@ -660,7 +665,7 @@
           <a:p>
             <a:fld id="{3FB6DB27-A4FB-6249-AA29-84868FD7983F}" type="datetimeFigureOut">
               <a:rPr lang="en-US" smtClean="0"/>
-              <a:t>5/14/21</a:t>
+              <a:t>5/18/21</a:t>
             </a:fld>
             <a:endParaRPr lang="en-US"/>
           </a:p>
@@ -858,7 +863,7 @@
           <a:p>
             <a:fld id="{3FB6DB27-A4FB-6249-AA29-84868FD7983F}" type="datetimeFigureOut">
               <a:rPr lang="en-US" smtClean="0"/>
-              <a:t>5/14/21</a:t>
+              <a:t>5/18/21</a:t>
             </a:fld>
             <a:endParaRPr lang="en-US"/>
           </a:p>
@@ -1133,7 +1138,7 @@
           <a:p>
             <a:fld id="{3FB6DB27-A4FB-6249-AA29-84868FD7983F}" type="datetimeFigureOut">
               <a:rPr lang="en-US" smtClean="0"/>
-              <a:t>5/14/21</a:t>
+              <a:t>5/18/21</a:t>
             </a:fld>
             <a:endParaRPr lang="en-US"/>
           </a:p>
@@ -1398,7 +1403,7 @@
           <a:p>
             <a:fld id="{3FB6DB27-A4FB-6249-AA29-84868FD7983F}" type="datetimeFigureOut">
               <a:rPr lang="en-US" smtClean="0"/>
-              <a:t>5/14/21</a:t>
+              <a:t>5/18/21</a:t>
             </a:fld>
             <a:endParaRPr lang="en-US"/>
           </a:p>
@@ -1810,7 +1815,7 @@
           <a:p>
             <a:fld id="{3FB6DB27-A4FB-6249-AA29-84868FD7983F}" type="datetimeFigureOut">
               <a:rPr lang="en-US" smtClean="0"/>
-              <a:t>5/14/21</a:t>
+              <a:t>5/18/21</a:t>
             </a:fld>
             <a:endParaRPr lang="en-US"/>
           </a:p>
@@ -1951,7 +1956,7 @@
           <a:p>
             <a:fld id="{3FB6DB27-A4FB-6249-AA29-84868FD7983F}" type="datetimeFigureOut">
               <a:rPr lang="en-US" smtClean="0"/>
-              <a:t>5/14/21</a:t>
+              <a:t>5/18/21</a:t>
             </a:fld>
             <a:endParaRPr lang="en-US"/>
           </a:p>
@@ -2064,7 +2069,7 @@
           <a:p>
             <a:fld id="{3FB6DB27-A4FB-6249-AA29-84868FD7983F}" type="datetimeFigureOut">
               <a:rPr lang="en-US" smtClean="0"/>
-              <a:t>5/14/21</a:t>
+              <a:t>5/18/21</a:t>
             </a:fld>
             <a:endParaRPr lang="en-US"/>
           </a:p>
@@ -2375,7 +2380,7 @@
           <a:p>
             <a:fld id="{3FB6DB27-A4FB-6249-AA29-84868FD7983F}" type="datetimeFigureOut">
               <a:rPr lang="en-US" smtClean="0"/>
-              <a:t>5/14/21</a:t>
+              <a:t>5/18/21</a:t>
             </a:fld>
             <a:endParaRPr lang="en-US"/>
           </a:p>
@@ -2663,7 +2668,7 @@
           <a:p>
             <a:fld id="{3FB6DB27-A4FB-6249-AA29-84868FD7983F}" type="datetimeFigureOut">
               <a:rPr lang="en-US" smtClean="0"/>
-              <a:t>5/14/21</a:t>
+              <a:t>5/18/21</a:t>
             </a:fld>
             <a:endParaRPr lang="en-US"/>
           </a:p>
@@ -2904,7 +2909,7 @@
           <a:p>
             <a:fld id="{3FB6DB27-A4FB-6249-AA29-84868FD7983F}" type="datetimeFigureOut">
               <a:rPr lang="en-US" smtClean="0"/>
-              <a:t>5/14/21</a:t>
+              <a:t>5/18/21</a:t>
             </a:fld>
             <a:endParaRPr lang="en-US"/>
           </a:p>
@@ -3802,7 +3807,7 @@
         <p:spPr>
           <a:xfrm>
             <a:off x="6553038" y="5826694"/>
-            <a:ext cx="2200275" cy="0"/>
+            <a:ext cx="2679452" cy="0"/>
           </a:xfrm>
           <a:prstGeom prst="line">
             <a:avLst/>
@@ -3882,12 +3887,18 @@
           <p:nvPr/>
         </p:nvSpPr>
         <p:spPr>
-          <a:xfrm rot="2726769" flipH="1">
-            <a:off x="10362910" y="4145103"/>
+          <a:xfrm rot="5400000" flipH="1">
+            <a:off x="9568062" y="4472761"/>
             <a:ext cx="914400" cy="914400"/>
           </a:xfrm>
           <a:prstGeom prst="circularArrow">
-            <a:avLst/>
+            <a:avLst>
+              <a:gd name="adj1" fmla="val 12500"/>
+              <a:gd name="adj2" fmla="val 1142319"/>
+              <a:gd name="adj3" fmla="val 20457681"/>
+              <a:gd name="adj4" fmla="val 16220386"/>
+              <a:gd name="adj5" fmla="val 12500"/>
+            </a:avLst>
           </a:prstGeom>
         </p:spPr>
         <p:style>
@@ -3919,6 +3930,2132 @@
           </a:p>
         </p:txBody>
       </p:sp>
+      <p:sp>
+        <p:nvSpPr>
+          <p:cNvPr id="17" name="Circular Arrow 16">
+            <a:extLst>
+              <a:ext uri="{FF2B5EF4-FFF2-40B4-BE49-F238E27FC236}">
+                <a16:creationId xmlns:a16="http://schemas.microsoft.com/office/drawing/2014/main" id="{871851F7-9067-1A4E-8800-E93ED80DFB70}"/>
+              </a:ext>
+            </a:extLst>
+          </p:cNvPr>
+          <p:cNvSpPr>
+            <a:spLocks noChangeAspect="1"/>
+          </p:cNvSpPr>
+          <p:nvPr/>
+        </p:nvSpPr>
+        <p:spPr>
+          <a:xfrm rot="5400000" flipH="1">
+            <a:off x="8246571" y="5339718"/>
+            <a:ext cx="914400" cy="914400"/>
+          </a:xfrm>
+          <a:prstGeom prst="circularArrow">
+            <a:avLst>
+              <a:gd name="adj1" fmla="val 12500"/>
+              <a:gd name="adj2" fmla="val 1142319"/>
+              <a:gd name="adj3" fmla="val 20457681"/>
+              <a:gd name="adj4" fmla="val 16220386"/>
+              <a:gd name="adj5" fmla="val 12500"/>
+            </a:avLst>
+          </a:prstGeom>
+        </p:spPr>
+        <p:style>
+          <a:lnRef idx="2">
+            <a:schemeClr val="accent1">
+              <a:shade val="50000"/>
+            </a:schemeClr>
+          </a:lnRef>
+          <a:fillRef idx="1">
+            <a:schemeClr val="accent1"/>
+          </a:fillRef>
+          <a:effectRef idx="0">
+            <a:schemeClr val="accent1"/>
+          </a:effectRef>
+          <a:fontRef idx="minor">
+            <a:schemeClr val="lt1"/>
+          </a:fontRef>
+        </p:style>
+        <p:txBody>
+          <a:bodyPr rtlCol="0" anchor="ctr"/>
+          <a:lstStyle/>
+          <a:p>
+            <a:pPr algn="ctr"/>
+            <a:endParaRPr lang="en-US">
+              <a:solidFill>
+                <a:schemeClr val="tx1"/>
+              </a:solidFill>
+            </a:endParaRPr>
+          </a:p>
+        </p:txBody>
+      </p:sp>
+      <p:sp>
+        <p:nvSpPr>
+          <p:cNvPr id="19" name="Circular Arrow 18">
+            <a:extLst>
+              <a:ext uri="{FF2B5EF4-FFF2-40B4-BE49-F238E27FC236}">
+                <a16:creationId xmlns:a16="http://schemas.microsoft.com/office/drawing/2014/main" id="{A18CFB64-820F-1243-8D58-2F9A53BCFA19}"/>
+              </a:ext>
+            </a:extLst>
+          </p:cNvPr>
+          <p:cNvSpPr>
+            <a:spLocks noChangeAspect="1"/>
+          </p:cNvSpPr>
+          <p:nvPr/>
+        </p:nvSpPr>
+        <p:spPr>
+          <a:xfrm rot="5400000" flipH="1">
+            <a:off x="10482462" y="3066487"/>
+            <a:ext cx="914400" cy="914400"/>
+          </a:xfrm>
+          <a:prstGeom prst="circularArrow">
+            <a:avLst>
+              <a:gd name="adj1" fmla="val 12500"/>
+              <a:gd name="adj2" fmla="val 1142319"/>
+              <a:gd name="adj3" fmla="val 20457681"/>
+              <a:gd name="adj4" fmla="val 16220386"/>
+              <a:gd name="adj5" fmla="val 12500"/>
+            </a:avLst>
+          </a:prstGeom>
+        </p:spPr>
+        <p:style>
+          <a:lnRef idx="2">
+            <a:schemeClr val="accent1">
+              <a:shade val="50000"/>
+            </a:schemeClr>
+          </a:lnRef>
+          <a:fillRef idx="1">
+            <a:schemeClr val="accent1"/>
+          </a:fillRef>
+          <a:effectRef idx="0">
+            <a:schemeClr val="accent1"/>
+          </a:effectRef>
+          <a:fontRef idx="minor">
+            <a:schemeClr val="lt1"/>
+          </a:fontRef>
+        </p:style>
+        <p:txBody>
+          <a:bodyPr rtlCol="0" anchor="ctr"/>
+          <a:lstStyle/>
+          <a:p>
+            <a:pPr algn="ctr"/>
+            <a:endParaRPr lang="en-US">
+              <a:solidFill>
+                <a:schemeClr val="tx1"/>
+              </a:solidFill>
+            </a:endParaRPr>
+          </a:p>
+        </p:txBody>
+      </p:sp>
+      <p:grpSp>
+        <p:nvGrpSpPr>
+          <p:cNvPr id="68" name="Group 67">
+            <a:extLst>
+              <a:ext uri="{FF2B5EF4-FFF2-40B4-BE49-F238E27FC236}">
+                <a16:creationId xmlns:a16="http://schemas.microsoft.com/office/drawing/2014/main" id="{94643A1C-F1AF-D542-A1D4-381BB6F45C8F}"/>
+              </a:ext>
+            </a:extLst>
+          </p:cNvPr>
+          <p:cNvGrpSpPr/>
+          <p:nvPr/>
+        </p:nvGrpSpPr>
+        <p:grpSpPr>
+          <a:xfrm>
+            <a:off x="9657450" y="664531"/>
+            <a:ext cx="1687343" cy="1687343"/>
+            <a:chOff x="9657450" y="664531"/>
+            <a:chExt cx="1687343" cy="1687343"/>
+          </a:xfrm>
+        </p:grpSpPr>
+        <p:sp>
+          <p:nvSpPr>
+            <p:cNvPr id="26" name="Oval 25">
+              <a:extLst>
+                <a:ext uri="{FF2B5EF4-FFF2-40B4-BE49-F238E27FC236}">
+                  <a16:creationId xmlns:a16="http://schemas.microsoft.com/office/drawing/2014/main" id="{4D199DB2-ACA8-C14C-A1C7-63C325673626}"/>
+                </a:ext>
+              </a:extLst>
+            </p:cNvPr>
+            <p:cNvSpPr>
+              <a:spLocks noChangeAspect="1"/>
+            </p:cNvSpPr>
+            <p:nvPr/>
+          </p:nvSpPr>
+          <p:spPr>
+            <a:xfrm rot="20342545">
+              <a:off x="9657450" y="664531"/>
+              <a:ext cx="1687343" cy="1687343"/>
+            </a:xfrm>
+            <a:prstGeom prst="ellipse">
+              <a:avLst/>
+            </a:prstGeom>
+            <a:noFill/>
+            <a:ln w="38100"/>
+          </p:spPr>
+          <p:style>
+            <a:lnRef idx="2">
+              <a:schemeClr val="accent1">
+                <a:shade val="50000"/>
+              </a:schemeClr>
+            </a:lnRef>
+            <a:fillRef idx="1">
+              <a:schemeClr val="accent1"/>
+            </a:fillRef>
+            <a:effectRef idx="0">
+              <a:schemeClr val="accent1"/>
+            </a:effectRef>
+            <a:fontRef idx="minor">
+              <a:schemeClr val="lt1"/>
+            </a:fontRef>
+          </p:style>
+          <p:txBody>
+            <a:bodyPr rtlCol="0" anchor="ctr"/>
+            <a:lstStyle/>
+            <a:p>
+              <a:pPr algn="ctr"/>
+              <a:endParaRPr lang="en-US"/>
+            </a:p>
+          </p:txBody>
+        </p:sp>
+        <p:pic>
+          <p:nvPicPr>
+            <p:cNvPr id="31" name="Picture 30" descr="Icon&#10;&#10;Description automatically generated">
+              <a:extLst>
+                <a:ext uri="{FF2B5EF4-FFF2-40B4-BE49-F238E27FC236}">
+                  <a16:creationId xmlns:a16="http://schemas.microsoft.com/office/drawing/2014/main" id="{C0769F31-8B7B-D049-B233-95351C2903F5}"/>
+                </a:ext>
+              </a:extLst>
+            </p:cNvPr>
+            <p:cNvPicPr>
+              <a:picLocks noChangeAspect="1"/>
+            </p:cNvPicPr>
+            <p:nvPr/>
+          </p:nvPicPr>
+          <p:blipFill>
+            <a:blip r:embed="rId3"/>
+            <a:stretch>
+              <a:fillRect/>
+            </a:stretch>
+          </p:blipFill>
+          <p:spPr>
+            <a:xfrm rot="20342545">
+              <a:off x="10148003" y="1135504"/>
+              <a:ext cx="686904" cy="686904"/>
+            </a:xfrm>
+            <a:prstGeom prst="rect">
+              <a:avLst/>
+            </a:prstGeom>
+          </p:spPr>
+        </p:pic>
+      </p:grpSp>
+      <p:cxnSp>
+        <p:nvCxnSpPr>
+          <p:cNvPr id="33" name="Straight Connector 32">
+            <a:extLst>
+              <a:ext uri="{FF2B5EF4-FFF2-40B4-BE49-F238E27FC236}">
+                <a16:creationId xmlns:a16="http://schemas.microsoft.com/office/drawing/2014/main" id="{746BD2F9-B9E5-4B43-993C-38FE12B7E627}"/>
+              </a:ext>
+            </a:extLst>
+          </p:cNvPr>
+          <p:cNvCxnSpPr>
+            <a:cxnSpLocks/>
+          </p:cNvCxnSpPr>
+          <p:nvPr/>
+        </p:nvCxnSpPr>
+        <p:spPr>
+          <a:xfrm flipH="1" flipV="1">
+            <a:off x="10072220" y="313992"/>
+            <a:ext cx="733664" cy="1965031"/>
+          </a:xfrm>
+          <a:prstGeom prst="line">
+            <a:avLst/>
+          </a:prstGeom>
+          <a:ln w="25400">
+            <a:prstDash val="lgDash"/>
+          </a:ln>
+        </p:spPr>
+        <p:style>
+          <a:lnRef idx="1">
+            <a:schemeClr val="accent1"/>
+          </a:lnRef>
+          <a:fillRef idx="0">
+            <a:schemeClr val="accent1"/>
+          </a:fillRef>
+          <a:effectRef idx="0">
+            <a:schemeClr val="accent1"/>
+          </a:effectRef>
+          <a:fontRef idx="minor">
+            <a:schemeClr val="tx1"/>
+          </a:fontRef>
+        </p:style>
+      </p:cxnSp>
+      <p:cxnSp>
+        <p:nvCxnSpPr>
+          <p:cNvPr id="22" name="Straight Connector 21">
+            <a:extLst>
+              <a:ext uri="{FF2B5EF4-FFF2-40B4-BE49-F238E27FC236}">
+                <a16:creationId xmlns:a16="http://schemas.microsoft.com/office/drawing/2014/main" id="{75B4C864-99C6-AF47-BC6B-F3EE167870CF}"/>
+              </a:ext>
+            </a:extLst>
+          </p:cNvPr>
+          <p:cNvCxnSpPr>
+            <a:cxnSpLocks/>
+          </p:cNvCxnSpPr>
+          <p:nvPr/>
+        </p:nvCxnSpPr>
+        <p:spPr>
+          <a:xfrm flipV="1">
+            <a:off x="10669350" y="488687"/>
+            <a:ext cx="562299" cy="2577800"/>
+          </a:xfrm>
+          <a:prstGeom prst="line">
+            <a:avLst/>
+          </a:prstGeom>
+          <a:ln w="25400">
+            <a:prstDash val="lgDash"/>
+          </a:ln>
+        </p:spPr>
+        <p:style>
+          <a:lnRef idx="1">
+            <a:schemeClr val="accent1"/>
+          </a:lnRef>
+          <a:fillRef idx="0">
+            <a:schemeClr val="accent1"/>
+          </a:fillRef>
+          <a:effectRef idx="0">
+            <a:schemeClr val="accent1"/>
+          </a:effectRef>
+          <a:fontRef idx="minor">
+            <a:schemeClr val="tx1"/>
+          </a:fontRef>
+        </p:style>
+      </p:cxnSp>
+      <p:sp>
+        <p:nvSpPr>
+          <p:cNvPr id="37" name="Circular Arrow 36">
+            <a:extLst>
+              <a:ext uri="{FF2B5EF4-FFF2-40B4-BE49-F238E27FC236}">
+                <a16:creationId xmlns:a16="http://schemas.microsoft.com/office/drawing/2014/main" id="{2098C93D-7D6B-A24A-8648-10FDFE72B09C}"/>
+              </a:ext>
+            </a:extLst>
+          </p:cNvPr>
+          <p:cNvSpPr>
+            <a:spLocks noChangeAspect="1"/>
+          </p:cNvSpPr>
+          <p:nvPr/>
+        </p:nvSpPr>
+        <p:spPr>
+          <a:xfrm rot="3233061" flipH="1">
+            <a:off x="10189371" y="757357"/>
+            <a:ext cx="914400" cy="914400"/>
+          </a:xfrm>
+          <a:prstGeom prst="circularArrow">
+            <a:avLst>
+              <a:gd name="adj1" fmla="val 12500"/>
+              <a:gd name="adj2" fmla="val 1142319"/>
+              <a:gd name="adj3" fmla="val 20457681"/>
+              <a:gd name="adj4" fmla="val 16220386"/>
+              <a:gd name="adj5" fmla="val 12500"/>
+            </a:avLst>
+          </a:prstGeom>
+        </p:spPr>
+        <p:style>
+          <a:lnRef idx="2">
+            <a:schemeClr val="accent1">
+              <a:shade val="50000"/>
+            </a:schemeClr>
+          </a:lnRef>
+          <a:fillRef idx="1">
+            <a:schemeClr val="accent1"/>
+          </a:fillRef>
+          <a:effectRef idx="0">
+            <a:schemeClr val="accent1"/>
+          </a:effectRef>
+          <a:fontRef idx="minor">
+            <a:schemeClr val="lt1"/>
+          </a:fontRef>
+        </p:style>
+        <p:txBody>
+          <a:bodyPr rtlCol="0" anchor="ctr"/>
+          <a:lstStyle/>
+          <a:p>
+            <a:pPr algn="ctr"/>
+            <a:endParaRPr lang="en-US">
+              <a:solidFill>
+                <a:schemeClr val="tx1"/>
+              </a:solidFill>
+            </a:endParaRPr>
+          </a:p>
+        </p:txBody>
+      </p:sp>
+      <mc:AlternateContent xmlns:mc="http://schemas.openxmlformats.org/markup-compatibility/2006">
+        <mc:Choice xmlns:a14="http://schemas.microsoft.com/office/drawing/2010/main" Requires="a14">
+          <p:sp>
+            <p:nvSpPr>
+              <p:cNvPr id="38" name="TextBox 37">
+                <a:extLst>
+                  <a:ext uri="{FF2B5EF4-FFF2-40B4-BE49-F238E27FC236}">
+                    <a16:creationId xmlns:a16="http://schemas.microsoft.com/office/drawing/2014/main" id="{C4B5DF06-DB5E-A648-89F7-498389DF4709}"/>
+                  </a:ext>
+                </a:extLst>
+              </p:cNvPr>
+              <p:cNvSpPr txBox="1"/>
+              <p:nvPr/>
+            </p:nvSpPr>
+            <p:spPr>
+              <a:xfrm>
+                <a:off x="9215822" y="5294779"/>
+                <a:ext cx="366244" cy="503340"/>
+              </a:xfrm>
+              <a:prstGeom prst="rect">
+                <a:avLst/>
+              </a:prstGeom>
+              <a:noFill/>
+            </p:spPr>
+            <p:txBody>
+              <a:bodyPr wrap="square" lIns="0" tIns="0" rIns="0" bIns="0" rtlCol="0">
+                <a:spAutoFit/>
+              </a:bodyPr>
+              <a:lstStyle/>
+              <a:p>
+                <a14:m>
+                  <m:oMathPara xmlns:m="http://schemas.openxmlformats.org/officeDocument/2006/math">
+                    <m:oMathParaPr>
+                      <m:jc m:val="centerGroup"/>
+                    </m:oMathParaPr>
+                    <m:oMath xmlns:m="http://schemas.openxmlformats.org/officeDocument/2006/math">
+                      <m:sSub>
+                        <m:sSubPr>
+                          <m:ctrlPr>
+                            <a:rPr lang="en-US" sz="3200" i="1" smtClean="0">
+                              <a:latin typeface="Cambria Math" panose="02040503050406030204" pitchFamily="18" charset="0"/>
+                            </a:rPr>
+                          </m:ctrlPr>
+                        </m:sSubPr>
+                        <m:e>
+                          <m:r>
+                            <a:rPr lang="en-US" sz="3200" i="1" smtClean="0">
+                              <a:latin typeface="Cambria Math" panose="02040503050406030204" pitchFamily="18" charset="0"/>
+                              <a:ea typeface="Cambria Math" panose="02040503050406030204" pitchFamily="18" charset="0"/>
+                            </a:rPr>
+                            <m:t>𝜃</m:t>
+                          </m:r>
+                        </m:e>
+                        <m:sub>
+                          <m:r>
+                            <a:rPr lang="en-US" sz="3200" b="0" i="1" smtClean="0">
+                              <a:latin typeface="Cambria Math" panose="02040503050406030204" pitchFamily="18" charset="0"/>
+                            </a:rPr>
+                            <m:t>1</m:t>
+                          </m:r>
+                        </m:sub>
+                      </m:sSub>
+                    </m:oMath>
+                  </m:oMathPara>
+                </a14:m>
+                <a:endParaRPr lang="en-US" sz="3200" dirty="0"/>
+              </a:p>
+            </p:txBody>
+          </p:sp>
+        </mc:Choice>
+        <mc:Fallback>
+          <p:sp>
+            <p:nvSpPr>
+              <p:cNvPr id="38" name="TextBox 37">
+                <a:extLst>
+                  <a:ext uri="{FF2B5EF4-FFF2-40B4-BE49-F238E27FC236}">
+                    <a16:creationId xmlns:a16="http://schemas.microsoft.com/office/drawing/2014/main" id="{C4B5DF06-DB5E-A648-89F7-498389DF4709}"/>
+                  </a:ext>
+                </a:extLst>
+              </p:cNvPr>
+              <p:cNvSpPr txBox="1">
+                <a:spLocks noRot="1" noChangeAspect="1" noMove="1" noResize="1" noEditPoints="1" noAdjustHandles="1" noChangeArrowheads="1" noChangeShapeType="1" noTextEdit="1"/>
+              </p:cNvSpPr>
+              <p:nvPr/>
+            </p:nvSpPr>
+            <p:spPr>
+              <a:xfrm>
+                <a:off x="9215822" y="5294779"/>
+                <a:ext cx="366244" cy="503340"/>
+              </a:xfrm>
+              <a:prstGeom prst="rect">
+                <a:avLst/>
+              </a:prstGeom>
+              <a:blipFill>
+                <a:blip r:embed="rId4"/>
+                <a:stretch>
+                  <a:fillRect l="-36667" r="-26667" b="-10000"/>
+                </a:stretch>
+              </a:blipFill>
+            </p:spPr>
+            <p:txBody>
+              <a:bodyPr/>
+              <a:lstStyle/>
+              <a:p>
+                <a:r>
+                  <a:rPr lang="en-US">
+                    <a:noFill/>
+                  </a:rPr>
+                  <a:t> </a:t>
+                </a:r>
+              </a:p>
+            </p:txBody>
+          </p:sp>
+        </mc:Fallback>
+      </mc:AlternateContent>
+      <mc:AlternateContent xmlns:mc="http://schemas.openxmlformats.org/markup-compatibility/2006">
+        <mc:Choice xmlns:a14="http://schemas.microsoft.com/office/drawing/2010/main" Requires="a14">
+          <p:sp>
+            <p:nvSpPr>
+              <p:cNvPr id="39" name="TextBox 38">
+                <a:extLst>
+                  <a:ext uri="{FF2B5EF4-FFF2-40B4-BE49-F238E27FC236}">
+                    <a16:creationId xmlns:a16="http://schemas.microsoft.com/office/drawing/2014/main" id="{54CF21FF-2EC2-064B-BACB-4D49C32B31D7}"/>
+                  </a:ext>
+                </a:extLst>
+              </p:cNvPr>
+              <p:cNvSpPr txBox="1"/>
+              <p:nvPr/>
+            </p:nvSpPr>
+            <p:spPr>
+              <a:xfrm>
+                <a:off x="11367192" y="2836925"/>
+                <a:ext cx="366244" cy="503340"/>
+              </a:xfrm>
+              <a:prstGeom prst="rect">
+                <a:avLst/>
+              </a:prstGeom>
+              <a:noFill/>
+            </p:spPr>
+            <p:txBody>
+              <a:bodyPr wrap="square" lIns="0" tIns="0" rIns="0" bIns="0" rtlCol="0">
+                <a:spAutoFit/>
+              </a:bodyPr>
+              <a:lstStyle/>
+              <a:p>
+                <a14:m>
+                  <m:oMathPara xmlns:m="http://schemas.openxmlformats.org/officeDocument/2006/math">
+                    <m:oMathParaPr>
+                      <m:jc m:val="centerGroup"/>
+                    </m:oMathParaPr>
+                    <m:oMath xmlns:m="http://schemas.openxmlformats.org/officeDocument/2006/math">
+                      <m:sSub>
+                        <m:sSubPr>
+                          <m:ctrlPr>
+                            <a:rPr lang="en-US" sz="3200" i="1" smtClean="0">
+                              <a:latin typeface="Cambria Math" panose="02040503050406030204" pitchFamily="18" charset="0"/>
+                            </a:rPr>
+                          </m:ctrlPr>
+                        </m:sSubPr>
+                        <m:e>
+                          <m:r>
+                            <a:rPr lang="en-US" sz="3200" i="1" smtClean="0">
+                              <a:latin typeface="Cambria Math" panose="02040503050406030204" pitchFamily="18" charset="0"/>
+                              <a:ea typeface="Cambria Math" panose="02040503050406030204" pitchFamily="18" charset="0"/>
+                            </a:rPr>
+                            <m:t>𝜃</m:t>
+                          </m:r>
+                        </m:e>
+                        <m:sub>
+                          <m:r>
+                            <a:rPr lang="en-US" sz="3200" b="0" i="1" smtClean="0">
+                              <a:latin typeface="Cambria Math" panose="02040503050406030204" pitchFamily="18" charset="0"/>
+                            </a:rPr>
+                            <m:t>3</m:t>
+                          </m:r>
+                        </m:sub>
+                      </m:sSub>
+                    </m:oMath>
+                  </m:oMathPara>
+                </a14:m>
+                <a:endParaRPr lang="en-US" sz="3200" dirty="0"/>
+              </a:p>
+            </p:txBody>
+          </p:sp>
+        </mc:Choice>
+        <mc:Fallback>
+          <p:sp>
+            <p:nvSpPr>
+              <p:cNvPr id="39" name="TextBox 38">
+                <a:extLst>
+                  <a:ext uri="{FF2B5EF4-FFF2-40B4-BE49-F238E27FC236}">
+                    <a16:creationId xmlns:a16="http://schemas.microsoft.com/office/drawing/2014/main" id="{54CF21FF-2EC2-064B-BACB-4D49C32B31D7}"/>
+                  </a:ext>
+                </a:extLst>
+              </p:cNvPr>
+              <p:cNvSpPr txBox="1">
+                <a:spLocks noRot="1" noChangeAspect="1" noMove="1" noResize="1" noEditPoints="1" noAdjustHandles="1" noChangeArrowheads="1" noChangeShapeType="1" noTextEdit="1"/>
+              </p:cNvSpPr>
+              <p:nvPr/>
+            </p:nvSpPr>
+            <p:spPr>
+              <a:xfrm>
+                <a:off x="11367192" y="2836925"/>
+                <a:ext cx="366244" cy="503340"/>
+              </a:xfrm>
+              <a:prstGeom prst="rect">
+                <a:avLst/>
+              </a:prstGeom>
+              <a:blipFill>
+                <a:blip r:embed="rId5"/>
+                <a:stretch>
+                  <a:fillRect l="-40000" r="-30000" b="-12195"/>
+                </a:stretch>
+              </a:blipFill>
+            </p:spPr>
+            <p:txBody>
+              <a:bodyPr/>
+              <a:lstStyle/>
+              <a:p>
+                <a:r>
+                  <a:rPr lang="en-US">
+                    <a:noFill/>
+                  </a:rPr>
+                  <a:t> </a:t>
+                </a:r>
+              </a:p>
+            </p:txBody>
+          </p:sp>
+        </mc:Fallback>
+      </mc:AlternateContent>
+      <mc:AlternateContent xmlns:mc="http://schemas.openxmlformats.org/markup-compatibility/2006">
+        <mc:Choice xmlns:a14="http://schemas.microsoft.com/office/drawing/2010/main" Requires="a14">
+          <p:sp>
+            <p:nvSpPr>
+              <p:cNvPr id="40" name="TextBox 39">
+                <a:extLst>
+                  <a:ext uri="{FF2B5EF4-FFF2-40B4-BE49-F238E27FC236}">
+                    <a16:creationId xmlns:a16="http://schemas.microsoft.com/office/drawing/2014/main" id="{3672B869-3B4F-D74C-AB5F-C9E6831A7638}"/>
+                  </a:ext>
+                </a:extLst>
+              </p:cNvPr>
+              <p:cNvSpPr txBox="1"/>
+              <p:nvPr/>
+            </p:nvSpPr>
+            <p:spPr>
+              <a:xfrm>
+                <a:off x="10519342" y="4416505"/>
+                <a:ext cx="366244" cy="503340"/>
+              </a:xfrm>
+              <a:prstGeom prst="rect">
+                <a:avLst/>
+              </a:prstGeom>
+              <a:noFill/>
+            </p:spPr>
+            <p:txBody>
+              <a:bodyPr wrap="square" lIns="0" tIns="0" rIns="0" bIns="0" rtlCol="0">
+                <a:spAutoFit/>
+              </a:bodyPr>
+              <a:lstStyle/>
+              <a:p>
+                <a14:m>
+                  <m:oMathPara xmlns:m="http://schemas.openxmlformats.org/officeDocument/2006/math">
+                    <m:oMathParaPr>
+                      <m:jc m:val="centerGroup"/>
+                    </m:oMathParaPr>
+                    <m:oMath xmlns:m="http://schemas.openxmlformats.org/officeDocument/2006/math">
+                      <m:sSub>
+                        <m:sSubPr>
+                          <m:ctrlPr>
+                            <a:rPr lang="en-US" sz="3200" i="1" smtClean="0">
+                              <a:latin typeface="Cambria Math" panose="02040503050406030204" pitchFamily="18" charset="0"/>
+                            </a:rPr>
+                          </m:ctrlPr>
+                        </m:sSubPr>
+                        <m:e>
+                          <m:r>
+                            <a:rPr lang="en-US" sz="3200" i="1" smtClean="0">
+                              <a:latin typeface="Cambria Math" panose="02040503050406030204" pitchFamily="18" charset="0"/>
+                              <a:ea typeface="Cambria Math" panose="02040503050406030204" pitchFamily="18" charset="0"/>
+                            </a:rPr>
+                            <m:t>𝜃</m:t>
+                          </m:r>
+                        </m:e>
+                        <m:sub>
+                          <m:r>
+                            <a:rPr lang="en-US" sz="3200" b="0" i="1" smtClean="0">
+                              <a:latin typeface="Cambria Math" panose="02040503050406030204" pitchFamily="18" charset="0"/>
+                            </a:rPr>
+                            <m:t>2</m:t>
+                          </m:r>
+                        </m:sub>
+                      </m:sSub>
+                    </m:oMath>
+                  </m:oMathPara>
+                </a14:m>
+                <a:endParaRPr lang="en-US" sz="3200" dirty="0"/>
+              </a:p>
+            </p:txBody>
+          </p:sp>
+        </mc:Choice>
+        <mc:Fallback>
+          <p:sp>
+            <p:nvSpPr>
+              <p:cNvPr id="40" name="TextBox 39">
+                <a:extLst>
+                  <a:ext uri="{FF2B5EF4-FFF2-40B4-BE49-F238E27FC236}">
+                    <a16:creationId xmlns:a16="http://schemas.microsoft.com/office/drawing/2014/main" id="{3672B869-3B4F-D74C-AB5F-C9E6831A7638}"/>
+                  </a:ext>
+                </a:extLst>
+              </p:cNvPr>
+              <p:cNvSpPr txBox="1">
+                <a:spLocks noRot="1" noChangeAspect="1" noMove="1" noResize="1" noEditPoints="1" noAdjustHandles="1" noChangeArrowheads="1" noChangeShapeType="1" noTextEdit="1"/>
+              </p:cNvSpPr>
+              <p:nvPr/>
+            </p:nvSpPr>
+            <p:spPr>
+              <a:xfrm>
+                <a:off x="10519342" y="4416505"/>
+                <a:ext cx="366244" cy="503340"/>
+              </a:xfrm>
+              <a:prstGeom prst="rect">
+                <a:avLst/>
+              </a:prstGeom>
+              <a:blipFill>
+                <a:blip r:embed="rId6"/>
+                <a:stretch>
+                  <a:fillRect l="-40000" r="-26667" b="-9756"/>
+                </a:stretch>
+              </a:blipFill>
+            </p:spPr>
+            <p:txBody>
+              <a:bodyPr/>
+              <a:lstStyle/>
+              <a:p>
+                <a:r>
+                  <a:rPr lang="en-US">
+                    <a:noFill/>
+                  </a:rPr>
+                  <a:t> </a:t>
+                </a:r>
+              </a:p>
+            </p:txBody>
+          </p:sp>
+        </mc:Fallback>
+      </mc:AlternateContent>
+      <mc:AlternateContent xmlns:mc="http://schemas.openxmlformats.org/markup-compatibility/2006">
+        <mc:Choice xmlns:a14="http://schemas.microsoft.com/office/drawing/2010/main" Requires="a14">
+          <p:sp>
+            <p:nvSpPr>
+              <p:cNvPr id="41" name="TextBox 40">
+                <a:extLst>
+                  <a:ext uri="{FF2B5EF4-FFF2-40B4-BE49-F238E27FC236}">
+                    <a16:creationId xmlns:a16="http://schemas.microsoft.com/office/drawing/2014/main" id="{2B2EF865-D9BF-2F4F-BCC4-DEEDDA969A40}"/>
+                  </a:ext>
+                </a:extLst>
+              </p:cNvPr>
+              <p:cNvSpPr txBox="1"/>
+              <p:nvPr/>
+            </p:nvSpPr>
+            <p:spPr>
+              <a:xfrm>
+                <a:off x="10571825" y="106651"/>
+                <a:ext cx="366244" cy="503340"/>
+              </a:xfrm>
+              <a:prstGeom prst="rect">
+                <a:avLst/>
+              </a:prstGeom>
+              <a:noFill/>
+            </p:spPr>
+            <p:txBody>
+              <a:bodyPr wrap="square" lIns="0" tIns="0" rIns="0" bIns="0" rtlCol="0">
+                <a:spAutoFit/>
+              </a:bodyPr>
+              <a:lstStyle/>
+              <a:p>
+                <a14:m>
+                  <m:oMathPara xmlns:m="http://schemas.openxmlformats.org/officeDocument/2006/math">
+                    <m:oMathParaPr>
+                      <m:jc m:val="centerGroup"/>
+                    </m:oMathParaPr>
+                    <m:oMath xmlns:m="http://schemas.openxmlformats.org/officeDocument/2006/math">
+                      <m:sSub>
+                        <m:sSubPr>
+                          <m:ctrlPr>
+                            <a:rPr lang="en-US" sz="3200" i="1" smtClean="0">
+                              <a:latin typeface="Cambria Math" panose="02040503050406030204" pitchFamily="18" charset="0"/>
+                            </a:rPr>
+                          </m:ctrlPr>
+                        </m:sSubPr>
+                        <m:e>
+                          <m:r>
+                            <a:rPr lang="en-US" sz="3200" i="1" smtClean="0">
+                              <a:latin typeface="Cambria Math" panose="02040503050406030204" pitchFamily="18" charset="0"/>
+                              <a:ea typeface="Cambria Math" panose="02040503050406030204" pitchFamily="18" charset="0"/>
+                            </a:rPr>
+                            <m:t>𝜃</m:t>
+                          </m:r>
+                        </m:e>
+                        <m:sub>
+                          <m:r>
+                            <a:rPr lang="en-US" sz="3200" b="0" i="1" smtClean="0">
+                              <a:latin typeface="Cambria Math" panose="02040503050406030204" pitchFamily="18" charset="0"/>
+                            </a:rPr>
+                            <m:t>𝐹𝑟</m:t>
+                          </m:r>
+                        </m:sub>
+                      </m:sSub>
+                    </m:oMath>
+                  </m:oMathPara>
+                </a14:m>
+                <a:endParaRPr lang="en-US" sz="3200" dirty="0"/>
+              </a:p>
+            </p:txBody>
+          </p:sp>
+        </mc:Choice>
+        <mc:Fallback>
+          <p:sp>
+            <p:nvSpPr>
+              <p:cNvPr id="41" name="TextBox 40">
+                <a:extLst>
+                  <a:ext uri="{FF2B5EF4-FFF2-40B4-BE49-F238E27FC236}">
+                    <a16:creationId xmlns:a16="http://schemas.microsoft.com/office/drawing/2014/main" id="{2B2EF865-D9BF-2F4F-BCC4-DEEDDA969A40}"/>
+                  </a:ext>
+                </a:extLst>
+              </p:cNvPr>
+              <p:cNvSpPr txBox="1">
+                <a:spLocks noRot="1" noChangeAspect="1" noMove="1" noResize="1" noEditPoints="1" noAdjustHandles="1" noChangeArrowheads="1" noChangeShapeType="1" noTextEdit="1"/>
+              </p:cNvSpPr>
+              <p:nvPr/>
+            </p:nvSpPr>
+            <p:spPr>
+              <a:xfrm>
+                <a:off x="10571825" y="106651"/>
+                <a:ext cx="366244" cy="503340"/>
+              </a:xfrm>
+              <a:prstGeom prst="rect">
+                <a:avLst/>
+              </a:prstGeom>
+              <a:blipFill>
+                <a:blip r:embed="rId7"/>
+                <a:stretch>
+                  <a:fillRect l="-36667" r="-73333" b="-12500"/>
+                </a:stretch>
+              </a:blipFill>
+            </p:spPr>
+            <p:txBody>
+              <a:bodyPr/>
+              <a:lstStyle/>
+              <a:p>
+                <a:r>
+                  <a:rPr lang="en-US">
+                    <a:noFill/>
+                  </a:rPr>
+                  <a:t> </a:t>
+                </a:r>
+              </a:p>
+            </p:txBody>
+          </p:sp>
+        </mc:Fallback>
+      </mc:AlternateContent>
+      <p:grpSp>
+        <p:nvGrpSpPr>
+          <p:cNvPr id="48" name="Group 47">
+            <a:extLst>
+              <a:ext uri="{FF2B5EF4-FFF2-40B4-BE49-F238E27FC236}">
+                <a16:creationId xmlns:a16="http://schemas.microsoft.com/office/drawing/2014/main" id="{DEC84228-5713-5246-A59C-50EB80F703D1}"/>
+              </a:ext>
+            </a:extLst>
+          </p:cNvPr>
+          <p:cNvGrpSpPr>
+            <a:grpSpLocks noChangeAspect="1"/>
+          </p:cNvGrpSpPr>
+          <p:nvPr/>
+        </p:nvGrpSpPr>
+        <p:grpSpPr>
+          <a:xfrm>
+            <a:off x="6553038" y="3088595"/>
+            <a:ext cx="3991137" cy="2738099"/>
+            <a:chOff x="6553038" y="3088595"/>
+            <a:chExt cx="3991137" cy="2738099"/>
+          </a:xfrm>
+        </p:grpSpPr>
+        <p:cxnSp>
+          <p:nvCxnSpPr>
+            <p:cNvPr id="43" name="Straight Arrow Connector 42">
+              <a:extLst>
+                <a:ext uri="{FF2B5EF4-FFF2-40B4-BE49-F238E27FC236}">
+                  <a16:creationId xmlns:a16="http://schemas.microsoft.com/office/drawing/2014/main" id="{AB03209E-6FB4-574F-88D2-B290B8A1EB35}"/>
+                </a:ext>
+              </a:extLst>
+            </p:cNvPr>
+            <p:cNvCxnSpPr>
+              <a:cxnSpLocks/>
+            </p:cNvCxnSpPr>
+            <p:nvPr/>
+          </p:nvCxnSpPr>
+          <p:spPr>
+            <a:xfrm>
+              <a:off x="6553038" y="5826694"/>
+              <a:ext cx="3991137" cy="0"/>
+            </a:xfrm>
+            <a:prstGeom prst="straightConnector1">
+              <a:avLst/>
+            </a:prstGeom>
+            <a:ln>
+              <a:solidFill>
+                <a:schemeClr val="tx1"/>
+              </a:solidFill>
+              <a:tailEnd type="triangle"/>
+            </a:ln>
+          </p:spPr>
+          <p:style>
+            <a:lnRef idx="1">
+              <a:schemeClr val="accent1"/>
+            </a:lnRef>
+            <a:fillRef idx="0">
+              <a:schemeClr val="accent1"/>
+            </a:fillRef>
+            <a:effectRef idx="0">
+              <a:schemeClr val="accent1"/>
+            </a:effectRef>
+            <a:fontRef idx="minor">
+              <a:schemeClr val="tx1"/>
+            </a:fontRef>
+          </p:style>
+        </p:cxnSp>
+        <p:cxnSp>
+          <p:nvCxnSpPr>
+            <p:cNvPr id="44" name="Straight Arrow Connector 43">
+              <a:extLst>
+                <a:ext uri="{FF2B5EF4-FFF2-40B4-BE49-F238E27FC236}">
+                  <a16:creationId xmlns:a16="http://schemas.microsoft.com/office/drawing/2014/main" id="{5CC64DAB-0DC9-2D43-8453-E7739E7658B3}"/>
+                </a:ext>
+              </a:extLst>
+            </p:cNvPr>
+            <p:cNvCxnSpPr>
+              <a:cxnSpLocks/>
+            </p:cNvCxnSpPr>
+            <p:nvPr/>
+          </p:nvCxnSpPr>
+          <p:spPr>
+            <a:xfrm flipV="1">
+              <a:off x="6553038" y="3088595"/>
+              <a:ext cx="0" cy="2738099"/>
+            </a:xfrm>
+            <a:prstGeom prst="straightConnector1">
+              <a:avLst/>
+            </a:prstGeom>
+            <a:ln>
+              <a:solidFill>
+                <a:schemeClr val="tx1"/>
+              </a:solidFill>
+              <a:tailEnd type="triangle"/>
+            </a:ln>
+          </p:spPr>
+          <p:style>
+            <a:lnRef idx="1">
+              <a:schemeClr val="accent1"/>
+            </a:lnRef>
+            <a:fillRef idx="0">
+              <a:schemeClr val="accent1"/>
+            </a:fillRef>
+            <a:effectRef idx="0">
+              <a:schemeClr val="accent1"/>
+            </a:effectRef>
+            <a:fontRef idx="minor">
+              <a:schemeClr val="tx1"/>
+            </a:fontRef>
+          </p:style>
+        </p:cxnSp>
+      </p:grpSp>
+      <p:cxnSp>
+        <p:nvCxnSpPr>
+          <p:cNvPr id="49" name="Straight Arrow Connector 48">
+            <a:extLst>
+              <a:ext uri="{FF2B5EF4-FFF2-40B4-BE49-F238E27FC236}">
+                <a16:creationId xmlns:a16="http://schemas.microsoft.com/office/drawing/2014/main" id="{874C2A9C-76CC-EF48-BAE0-F5BD82C42A98}"/>
+              </a:ext>
+            </a:extLst>
+          </p:cNvPr>
+          <p:cNvCxnSpPr/>
+          <p:nvPr/>
+        </p:nvCxnSpPr>
+        <p:spPr>
+          <a:xfrm>
+            <a:off x="6553038" y="5826694"/>
+            <a:ext cx="4015665" cy="0"/>
+          </a:xfrm>
+          <a:prstGeom prst="straightConnector1">
+            <a:avLst/>
+          </a:prstGeom>
+          <a:ln>
+            <a:solidFill>
+              <a:schemeClr val="tx1"/>
+            </a:solidFill>
+            <a:tailEnd type="triangle"/>
+          </a:ln>
+        </p:spPr>
+        <p:style>
+          <a:lnRef idx="1">
+            <a:schemeClr val="accent1"/>
+          </a:lnRef>
+          <a:fillRef idx="0">
+            <a:schemeClr val="accent1"/>
+          </a:fillRef>
+          <a:effectRef idx="0">
+            <a:schemeClr val="accent1"/>
+          </a:effectRef>
+          <a:fontRef idx="minor">
+            <a:schemeClr val="tx1"/>
+          </a:fontRef>
+        </p:style>
+      </p:cxnSp>
+      <mc:AlternateContent xmlns:mc="http://schemas.openxmlformats.org/markup-compatibility/2006">
+        <mc:Choice xmlns:a14="http://schemas.microsoft.com/office/drawing/2010/main" Requires="a14">
+          <p:sp>
+            <p:nvSpPr>
+              <p:cNvPr id="50" name="TextBox 49">
+                <a:extLst>
+                  <a:ext uri="{FF2B5EF4-FFF2-40B4-BE49-F238E27FC236}">
+                    <a16:creationId xmlns:a16="http://schemas.microsoft.com/office/drawing/2014/main" id="{5C5B664B-0A09-5B4A-B72F-00219B501B6F}"/>
+                  </a:ext>
+                </a:extLst>
+              </p:cNvPr>
+              <p:cNvSpPr txBox="1"/>
+              <p:nvPr/>
+            </p:nvSpPr>
+            <p:spPr>
+              <a:xfrm>
+                <a:off x="10543655" y="5644061"/>
+                <a:ext cx="348508" cy="369332"/>
+              </a:xfrm>
+              <a:prstGeom prst="rect">
+                <a:avLst/>
+              </a:prstGeom>
+              <a:noFill/>
+            </p:spPr>
+            <p:txBody>
+              <a:bodyPr wrap="square" lIns="0" tIns="0" rIns="0" bIns="0" rtlCol="0">
+                <a:spAutoFit/>
+              </a:bodyPr>
+              <a:lstStyle/>
+              <a:p>
+                <a14:m>
+                  <m:oMathPara xmlns:m="http://schemas.openxmlformats.org/officeDocument/2006/math">
+                    <m:oMathParaPr>
+                      <m:jc m:val="centerGroup"/>
+                    </m:oMathParaPr>
+                    <m:oMath xmlns:m="http://schemas.openxmlformats.org/officeDocument/2006/math">
+                      <m:r>
+                        <a:rPr lang="en-US" sz="2400" i="1" smtClean="0">
+                          <a:latin typeface="Cambria Math" panose="02040503050406030204" pitchFamily="18" charset="0"/>
+                        </a:rPr>
+                        <m:t>𝑥</m:t>
+                      </m:r>
+                    </m:oMath>
+                  </m:oMathPara>
+                </a14:m>
+                <a:endParaRPr lang="en-US" sz="2400" dirty="0"/>
+              </a:p>
+            </p:txBody>
+          </p:sp>
+        </mc:Choice>
+        <mc:Fallback>
+          <p:sp>
+            <p:nvSpPr>
+              <p:cNvPr id="50" name="TextBox 49">
+                <a:extLst>
+                  <a:ext uri="{FF2B5EF4-FFF2-40B4-BE49-F238E27FC236}">
+                    <a16:creationId xmlns:a16="http://schemas.microsoft.com/office/drawing/2014/main" id="{5C5B664B-0A09-5B4A-B72F-00219B501B6F}"/>
+                  </a:ext>
+                </a:extLst>
+              </p:cNvPr>
+              <p:cNvSpPr txBox="1">
+                <a:spLocks noRot="1" noChangeAspect="1" noMove="1" noResize="1" noEditPoints="1" noAdjustHandles="1" noChangeArrowheads="1" noChangeShapeType="1" noTextEdit="1"/>
+              </p:cNvSpPr>
+              <p:nvPr/>
+            </p:nvSpPr>
+            <p:spPr>
+              <a:xfrm>
+                <a:off x="10543655" y="5644061"/>
+                <a:ext cx="348508" cy="369332"/>
+              </a:xfrm>
+              <a:prstGeom prst="rect">
+                <a:avLst/>
+              </a:prstGeom>
+              <a:blipFill>
+                <a:blip r:embed="rId8"/>
+                <a:stretch>
+                  <a:fillRect/>
+                </a:stretch>
+              </a:blipFill>
+            </p:spPr>
+            <p:txBody>
+              <a:bodyPr/>
+              <a:lstStyle/>
+              <a:p>
+                <a:r>
+                  <a:rPr lang="en-US">
+                    <a:noFill/>
+                  </a:rPr>
+                  <a:t> </a:t>
+                </a:r>
+              </a:p>
+            </p:txBody>
+          </p:sp>
+        </mc:Fallback>
+      </mc:AlternateContent>
+      <mc:AlternateContent xmlns:mc="http://schemas.openxmlformats.org/markup-compatibility/2006">
+        <mc:Choice xmlns:a14="http://schemas.microsoft.com/office/drawing/2010/main" Requires="a14">
+          <p:sp>
+            <p:nvSpPr>
+              <p:cNvPr id="51" name="TextBox 50">
+                <a:extLst>
+                  <a:ext uri="{FF2B5EF4-FFF2-40B4-BE49-F238E27FC236}">
+                    <a16:creationId xmlns:a16="http://schemas.microsoft.com/office/drawing/2014/main" id="{DB55D32A-87AE-CB41-AE14-98D6AD7A8CD1}"/>
+                  </a:ext>
+                </a:extLst>
+              </p:cNvPr>
+              <p:cNvSpPr txBox="1"/>
+              <p:nvPr/>
+            </p:nvSpPr>
+            <p:spPr>
+              <a:xfrm>
+                <a:off x="6383114" y="2703904"/>
+                <a:ext cx="348508" cy="369332"/>
+              </a:xfrm>
+              <a:prstGeom prst="rect">
+                <a:avLst/>
+              </a:prstGeom>
+              <a:noFill/>
+            </p:spPr>
+            <p:txBody>
+              <a:bodyPr wrap="square" lIns="0" tIns="0" rIns="0" bIns="0" rtlCol="0">
+                <a:spAutoFit/>
+              </a:bodyPr>
+              <a:lstStyle/>
+              <a:p>
+                <a14:m>
+                  <m:oMathPara xmlns:m="http://schemas.openxmlformats.org/officeDocument/2006/math">
+                    <m:oMathParaPr>
+                      <m:jc m:val="centerGroup"/>
+                    </m:oMathParaPr>
+                    <m:oMath xmlns:m="http://schemas.openxmlformats.org/officeDocument/2006/math">
+                      <m:r>
+                        <a:rPr lang="en-US" sz="2400" b="0" i="1" smtClean="0">
+                          <a:latin typeface="Cambria Math" panose="02040503050406030204" pitchFamily="18" charset="0"/>
+                        </a:rPr>
+                        <m:t>𝑦</m:t>
+                      </m:r>
+                    </m:oMath>
+                  </m:oMathPara>
+                </a14:m>
+                <a:endParaRPr lang="en-US" sz="2400" dirty="0"/>
+              </a:p>
+            </p:txBody>
+          </p:sp>
+        </mc:Choice>
+        <mc:Fallback>
+          <p:sp>
+            <p:nvSpPr>
+              <p:cNvPr id="51" name="TextBox 50">
+                <a:extLst>
+                  <a:ext uri="{FF2B5EF4-FFF2-40B4-BE49-F238E27FC236}">
+                    <a16:creationId xmlns:a16="http://schemas.microsoft.com/office/drawing/2014/main" id="{DB55D32A-87AE-CB41-AE14-98D6AD7A8CD1}"/>
+                  </a:ext>
+                </a:extLst>
+              </p:cNvPr>
+              <p:cNvSpPr txBox="1">
+                <a:spLocks noRot="1" noChangeAspect="1" noMove="1" noResize="1" noEditPoints="1" noAdjustHandles="1" noChangeArrowheads="1" noChangeShapeType="1" noTextEdit="1"/>
+              </p:cNvSpPr>
+              <p:nvPr/>
+            </p:nvSpPr>
+            <p:spPr>
+              <a:xfrm>
+                <a:off x="6383114" y="2703904"/>
+                <a:ext cx="348508" cy="369332"/>
+              </a:xfrm>
+              <a:prstGeom prst="rect">
+                <a:avLst/>
+              </a:prstGeom>
+              <a:blipFill>
+                <a:blip r:embed="rId9"/>
+                <a:stretch>
+                  <a:fillRect l="-3571" r="-3571" b="-27586"/>
+                </a:stretch>
+              </a:blipFill>
+            </p:spPr>
+            <p:txBody>
+              <a:bodyPr/>
+              <a:lstStyle/>
+              <a:p>
+                <a:r>
+                  <a:rPr lang="en-US">
+                    <a:noFill/>
+                  </a:rPr>
+                  <a:t> </a:t>
+                </a:r>
+              </a:p>
+            </p:txBody>
+          </p:sp>
+        </mc:Fallback>
+      </mc:AlternateContent>
+      <mc:AlternateContent xmlns:mc="http://schemas.openxmlformats.org/markup-compatibility/2006">
+        <mc:Choice xmlns:a14="http://schemas.microsoft.com/office/drawing/2010/main" Requires="a14">
+          <p:sp>
+            <p:nvSpPr>
+              <p:cNvPr id="52" name="TextBox 51">
+                <a:extLst>
+                  <a:ext uri="{FF2B5EF4-FFF2-40B4-BE49-F238E27FC236}">
+                    <a16:creationId xmlns:a16="http://schemas.microsoft.com/office/drawing/2014/main" id="{2B0C84BB-6FEF-7D41-93ED-CB9D31B42256}"/>
+                  </a:ext>
+                </a:extLst>
+              </p:cNvPr>
+              <p:cNvSpPr txBox="1"/>
+              <p:nvPr/>
+            </p:nvSpPr>
+            <p:spPr>
+              <a:xfrm>
+                <a:off x="6996318" y="4767694"/>
+                <a:ext cx="1202055" cy="369332"/>
+              </a:xfrm>
+              <a:prstGeom prst="rect">
+                <a:avLst/>
+              </a:prstGeom>
+              <a:noFill/>
+            </p:spPr>
+            <p:txBody>
+              <a:bodyPr wrap="square" lIns="0" tIns="0" rIns="0" bIns="0" rtlCol="0">
+                <a:spAutoFit/>
+              </a:bodyPr>
+              <a:lstStyle/>
+              <a:p>
+                <a14:m>
+                  <m:oMath xmlns:m="http://schemas.openxmlformats.org/officeDocument/2006/math">
+                    <m:sSub>
+                      <m:sSubPr>
+                        <m:ctrlPr>
+                          <a:rPr lang="en-US" sz="2400" i="1" smtClean="0">
+                            <a:latin typeface="Cambria Math" panose="02040503050406030204" pitchFamily="18" charset="0"/>
+                          </a:rPr>
+                        </m:ctrlPr>
+                      </m:sSubPr>
+                      <m:e>
+                        <m:r>
+                          <a:rPr lang="en-US" sz="2400" b="0" i="1" smtClean="0">
+                            <a:latin typeface="Cambria Math" panose="02040503050406030204" pitchFamily="18" charset="0"/>
+                          </a:rPr>
+                          <m:t>𝑚</m:t>
+                        </m:r>
+                      </m:e>
+                      <m:sub>
+                        <m:r>
+                          <a:rPr lang="en-US" sz="2400" b="0" i="1" smtClean="0">
+                            <a:latin typeface="Cambria Math" panose="02040503050406030204" pitchFamily="18" charset="0"/>
+                          </a:rPr>
+                          <m:t>1</m:t>
+                        </m:r>
+                      </m:sub>
+                    </m:sSub>
+                  </m:oMath>
+                </a14:m>
+                <a:r>
+                  <a:rPr lang="en-US" sz="2400" dirty="0">
+                    <a:latin typeface="Times New Roman" panose="02020603050405020304" pitchFamily="18" charset="0"/>
+                    <a:cs typeface="Times New Roman" panose="02020603050405020304" pitchFamily="18" charset="0"/>
+                  </a:rPr>
+                  <a:t>,</a:t>
+                </a:r>
+                <a14:m>
+                  <m:oMath xmlns:m="http://schemas.openxmlformats.org/officeDocument/2006/math">
+                    <m:sSub>
+                      <m:sSubPr>
+                        <m:ctrlPr>
+                          <a:rPr lang="en-US" sz="2400" i="1">
+                            <a:latin typeface="Cambria Math" panose="02040503050406030204" pitchFamily="18" charset="0"/>
+                          </a:rPr>
+                        </m:ctrlPr>
+                      </m:sSubPr>
+                      <m:e>
+                        <m:r>
+                          <a:rPr lang="en-US" sz="2400" b="0" i="1" smtClean="0">
+                            <a:latin typeface="Cambria Math" panose="02040503050406030204" pitchFamily="18" charset="0"/>
+                          </a:rPr>
+                          <m:t> </m:t>
+                        </m:r>
+                        <m:r>
+                          <a:rPr lang="en-US" sz="2400" b="0" i="1" smtClean="0">
+                            <a:latin typeface="Cambria Math" panose="02040503050406030204" pitchFamily="18" charset="0"/>
+                          </a:rPr>
+                          <m:t>𝑙</m:t>
+                        </m:r>
+                      </m:e>
+                      <m:sub>
+                        <m:r>
+                          <a:rPr lang="en-US" sz="2400" i="1">
+                            <a:latin typeface="Cambria Math" panose="02040503050406030204" pitchFamily="18" charset="0"/>
+                          </a:rPr>
+                          <m:t>1</m:t>
+                        </m:r>
+                      </m:sub>
+                    </m:sSub>
+                    <m:r>
+                      <a:rPr lang="en-US" sz="2400" b="0" i="1" smtClean="0">
+                        <a:latin typeface="Cambria Math" panose="02040503050406030204" pitchFamily="18" charset="0"/>
+                      </a:rPr>
+                      <m:t>,</m:t>
+                    </m:r>
+                  </m:oMath>
+                </a14:m>
+                <a:r>
+                  <a:rPr lang="en-US" sz="2400" dirty="0">
+                    <a:latin typeface="Times New Roman" panose="02020603050405020304" pitchFamily="18" charset="0"/>
+                    <a:cs typeface="Times New Roman" panose="02020603050405020304" pitchFamily="18" charset="0"/>
+                  </a:rPr>
+                  <a:t> </a:t>
+                </a:r>
+                <a14:m>
+                  <m:oMath xmlns:m="http://schemas.openxmlformats.org/officeDocument/2006/math">
+                    <m:sSub>
+                      <m:sSubPr>
+                        <m:ctrlPr>
+                          <a:rPr lang="en-US" sz="2400" i="1">
+                            <a:latin typeface="Cambria Math" panose="02040503050406030204" pitchFamily="18" charset="0"/>
+                          </a:rPr>
+                        </m:ctrlPr>
+                      </m:sSubPr>
+                      <m:e>
+                        <m:r>
+                          <a:rPr lang="en-US" sz="2400" i="1">
+                            <a:latin typeface="Cambria Math" panose="02040503050406030204" pitchFamily="18" charset="0"/>
+                          </a:rPr>
+                          <m:t> </m:t>
+                        </m:r>
+                        <m:r>
+                          <a:rPr lang="en-US" sz="2400" b="0" i="1" smtClean="0">
+                            <a:latin typeface="Cambria Math" panose="02040503050406030204" pitchFamily="18" charset="0"/>
+                          </a:rPr>
+                          <m:t>𝐼</m:t>
+                        </m:r>
+                      </m:e>
+                      <m:sub>
+                        <m:r>
+                          <a:rPr lang="en-US" sz="2400" i="1">
+                            <a:latin typeface="Cambria Math" panose="02040503050406030204" pitchFamily="18" charset="0"/>
+                          </a:rPr>
+                          <m:t>1</m:t>
+                        </m:r>
+                      </m:sub>
+                    </m:sSub>
+                  </m:oMath>
+                </a14:m>
+                <a:endParaRPr lang="en-US" sz="2400" dirty="0">
+                  <a:latin typeface="Times New Roman" panose="02020603050405020304" pitchFamily="18" charset="0"/>
+                  <a:cs typeface="Times New Roman" panose="02020603050405020304" pitchFamily="18" charset="0"/>
+                </a:endParaRPr>
+              </a:p>
+            </p:txBody>
+          </p:sp>
+        </mc:Choice>
+        <mc:Fallback>
+          <p:sp>
+            <p:nvSpPr>
+              <p:cNvPr id="52" name="TextBox 51">
+                <a:extLst>
+                  <a:ext uri="{FF2B5EF4-FFF2-40B4-BE49-F238E27FC236}">
+                    <a16:creationId xmlns:a16="http://schemas.microsoft.com/office/drawing/2014/main" id="{2B0C84BB-6FEF-7D41-93ED-CB9D31B42256}"/>
+                  </a:ext>
+                </a:extLst>
+              </p:cNvPr>
+              <p:cNvSpPr txBox="1">
+                <a:spLocks noRot="1" noChangeAspect="1" noMove="1" noResize="1" noEditPoints="1" noAdjustHandles="1" noChangeArrowheads="1" noChangeShapeType="1" noTextEdit="1"/>
+              </p:cNvSpPr>
+              <p:nvPr/>
+            </p:nvSpPr>
+            <p:spPr>
+              <a:xfrm>
+                <a:off x="6996318" y="4767694"/>
+                <a:ext cx="1202055" cy="369332"/>
+              </a:xfrm>
+              <a:prstGeom prst="rect">
+                <a:avLst/>
+              </a:prstGeom>
+              <a:blipFill>
+                <a:blip r:embed="rId10"/>
+                <a:stretch>
+                  <a:fillRect l="-6316" t="-26667" r="-5263" b="-50000"/>
+                </a:stretch>
+              </a:blipFill>
+            </p:spPr>
+            <p:txBody>
+              <a:bodyPr/>
+              <a:lstStyle/>
+              <a:p>
+                <a:r>
+                  <a:rPr lang="en-US">
+                    <a:noFill/>
+                  </a:rPr>
+                  <a:t> </a:t>
+                </a:r>
+              </a:p>
+            </p:txBody>
+          </p:sp>
+        </mc:Fallback>
+      </mc:AlternateContent>
+      <mc:AlternateContent xmlns:mc="http://schemas.openxmlformats.org/markup-compatibility/2006">
+        <mc:Choice xmlns:a14="http://schemas.microsoft.com/office/drawing/2010/main" Requires="a14">
+          <p:sp>
+            <p:nvSpPr>
+              <p:cNvPr id="54" name="TextBox 53">
+                <a:extLst>
+                  <a:ext uri="{FF2B5EF4-FFF2-40B4-BE49-F238E27FC236}">
+                    <a16:creationId xmlns:a16="http://schemas.microsoft.com/office/drawing/2014/main" id="{43BB0ED8-4691-444A-9C97-D925409F6FF9}"/>
+                  </a:ext>
+                </a:extLst>
+              </p:cNvPr>
+              <p:cNvSpPr txBox="1"/>
+              <p:nvPr/>
+            </p:nvSpPr>
+            <p:spPr>
+              <a:xfrm>
+                <a:off x="9733868" y="1465512"/>
+                <a:ext cx="348508" cy="398955"/>
+              </a:xfrm>
+              <a:prstGeom prst="rect">
+                <a:avLst/>
+              </a:prstGeom>
+              <a:noFill/>
+            </p:spPr>
+            <p:txBody>
+              <a:bodyPr wrap="square" lIns="0" tIns="0" rIns="0" bIns="0" rtlCol="0">
+                <a:spAutoFit/>
+              </a:bodyPr>
+              <a:lstStyle/>
+              <a:p>
+                <a14:m>
+                  <m:oMathPara xmlns:m="http://schemas.openxmlformats.org/officeDocument/2006/math">
+                    <m:oMathParaPr>
+                      <m:jc m:val="centerGroup"/>
+                    </m:oMathParaPr>
+                    <m:oMath xmlns:m="http://schemas.openxmlformats.org/officeDocument/2006/math">
+                      <m:sSub>
+                        <m:sSubPr>
+                          <m:ctrlPr>
+                            <a:rPr lang="en-US" sz="2400" i="1" smtClean="0">
+                              <a:latin typeface="Cambria Math" panose="02040503050406030204" pitchFamily="18" charset="0"/>
+                            </a:rPr>
+                          </m:ctrlPr>
+                        </m:sSubPr>
+                        <m:e>
+                          <m:r>
+                            <a:rPr lang="en-US" sz="2400" b="0" i="1" smtClean="0">
+                              <a:latin typeface="Cambria Math" panose="02040503050406030204" pitchFamily="18" charset="0"/>
+                            </a:rPr>
+                            <m:t>𝑚</m:t>
+                          </m:r>
+                        </m:e>
+                        <m:sub>
+                          <m:r>
+                            <a:rPr lang="en-US" sz="2400" b="0" i="1" smtClean="0">
+                              <a:latin typeface="Cambria Math" panose="02040503050406030204" pitchFamily="18" charset="0"/>
+                            </a:rPr>
+                            <m:t>𝑓𝑟</m:t>
+                          </m:r>
+                        </m:sub>
+                      </m:sSub>
+                    </m:oMath>
+                  </m:oMathPara>
+                </a14:m>
+                <a:endParaRPr lang="en-US" sz="2400" dirty="0"/>
+              </a:p>
+            </p:txBody>
+          </p:sp>
+        </mc:Choice>
+        <mc:Fallback>
+          <p:sp>
+            <p:nvSpPr>
+              <p:cNvPr id="54" name="TextBox 53">
+                <a:extLst>
+                  <a:ext uri="{FF2B5EF4-FFF2-40B4-BE49-F238E27FC236}">
+                    <a16:creationId xmlns:a16="http://schemas.microsoft.com/office/drawing/2014/main" id="{43BB0ED8-4691-444A-9C97-D925409F6FF9}"/>
+                  </a:ext>
+                </a:extLst>
+              </p:cNvPr>
+              <p:cNvSpPr txBox="1">
+                <a:spLocks noRot="1" noChangeAspect="1" noMove="1" noResize="1" noEditPoints="1" noAdjustHandles="1" noChangeArrowheads="1" noChangeShapeType="1" noTextEdit="1"/>
+              </p:cNvSpPr>
+              <p:nvPr/>
+            </p:nvSpPr>
+            <p:spPr>
+              <a:xfrm>
+                <a:off x="9733868" y="1465512"/>
+                <a:ext cx="348508" cy="398955"/>
+              </a:xfrm>
+              <a:prstGeom prst="rect">
+                <a:avLst/>
+              </a:prstGeom>
+              <a:blipFill>
+                <a:blip r:embed="rId11"/>
+                <a:stretch>
+                  <a:fillRect l="-21429" r="-71429" b="-28125"/>
+                </a:stretch>
+              </a:blipFill>
+            </p:spPr>
+            <p:txBody>
+              <a:bodyPr/>
+              <a:lstStyle/>
+              <a:p>
+                <a:r>
+                  <a:rPr lang="en-US">
+                    <a:noFill/>
+                  </a:rPr>
+                  <a:t> </a:t>
+                </a:r>
+              </a:p>
+            </p:txBody>
+          </p:sp>
+        </mc:Fallback>
+      </mc:AlternateContent>
+      <mc:AlternateContent xmlns:mc="http://schemas.openxmlformats.org/markup-compatibility/2006">
+        <mc:Choice xmlns:a14="http://schemas.microsoft.com/office/drawing/2010/main" Requires="a14">
+          <p:sp>
+            <p:nvSpPr>
+              <p:cNvPr id="57" name="TextBox 56">
+                <a:extLst>
+                  <a:ext uri="{FF2B5EF4-FFF2-40B4-BE49-F238E27FC236}">
+                    <a16:creationId xmlns:a16="http://schemas.microsoft.com/office/drawing/2014/main" id="{6810C673-B812-044F-801C-22933DC37E7C}"/>
+                  </a:ext>
+                </a:extLst>
+              </p:cNvPr>
+              <p:cNvSpPr txBox="1"/>
+              <p:nvPr/>
+            </p:nvSpPr>
+            <p:spPr>
+              <a:xfrm>
+                <a:off x="8328454" y="3898558"/>
+                <a:ext cx="1383309" cy="369332"/>
+              </a:xfrm>
+              <a:prstGeom prst="rect">
+                <a:avLst/>
+              </a:prstGeom>
+              <a:noFill/>
+            </p:spPr>
+            <p:txBody>
+              <a:bodyPr wrap="square" lIns="0" tIns="0" rIns="0" bIns="0" rtlCol="0">
+                <a:spAutoFit/>
+              </a:bodyPr>
+              <a:lstStyle/>
+              <a:p>
+                <a14:m>
+                  <m:oMath xmlns:m="http://schemas.openxmlformats.org/officeDocument/2006/math">
+                    <m:sSub>
+                      <m:sSubPr>
+                        <m:ctrlPr>
+                          <a:rPr lang="en-US" sz="2400" i="1" smtClean="0">
+                            <a:latin typeface="Cambria Math" panose="02040503050406030204" pitchFamily="18" charset="0"/>
+                          </a:rPr>
+                        </m:ctrlPr>
+                      </m:sSubPr>
+                      <m:e>
+                        <m:r>
+                          <a:rPr lang="en-US" sz="2400" b="0" i="1" smtClean="0">
+                            <a:latin typeface="Cambria Math" panose="02040503050406030204" pitchFamily="18" charset="0"/>
+                          </a:rPr>
+                          <m:t>𝑚</m:t>
+                        </m:r>
+                      </m:e>
+                      <m:sub>
+                        <m:r>
+                          <a:rPr lang="en-US" sz="2400" b="0" i="1" smtClean="0">
+                            <a:latin typeface="Cambria Math" panose="02040503050406030204" pitchFamily="18" charset="0"/>
+                          </a:rPr>
+                          <m:t>2</m:t>
+                        </m:r>
+                      </m:sub>
+                    </m:sSub>
+                  </m:oMath>
+                </a14:m>
+                <a:r>
+                  <a:rPr lang="en-US" sz="2400" dirty="0">
+                    <a:latin typeface="Times New Roman" panose="02020603050405020304" pitchFamily="18" charset="0"/>
+                    <a:cs typeface="Times New Roman" panose="02020603050405020304" pitchFamily="18" charset="0"/>
+                  </a:rPr>
+                  <a:t>,</a:t>
+                </a:r>
+                <a14:m>
+                  <m:oMath xmlns:m="http://schemas.openxmlformats.org/officeDocument/2006/math">
+                    <m:sSub>
+                      <m:sSubPr>
+                        <m:ctrlPr>
+                          <a:rPr lang="en-US" sz="2400" i="1">
+                            <a:latin typeface="Cambria Math" panose="02040503050406030204" pitchFamily="18" charset="0"/>
+                          </a:rPr>
+                        </m:ctrlPr>
+                      </m:sSubPr>
+                      <m:e>
+                        <m:r>
+                          <a:rPr lang="en-US" sz="2400" b="0" i="1" smtClean="0">
+                            <a:latin typeface="Cambria Math" panose="02040503050406030204" pitchFamily="18" charset="0"/>
+                          </a:rPr>
+                          <m:t> </m:t>
+                        </m:r>
+                        <m:r>
+                          <a:rPr lang="en-US" sz="2400" b="0" i="1" smtClean="0">
+                            <a:latin typeface="Cambria Math" panose="02040503050406030204" pitchFamily="18" charset="0"/>
+                          </a:rPr>
+                          <m:t>𝑙</m:t>
+                        </m:r>
+                      </m:e>
+                      <m:sub>
+                        <m:r>
+                          <a:rPr lang="en-US" sz="2400" b="0" i="1" smtClean="0">
+                            <a:latin typeface="Cambria Math" panose="02040503050406030204" pitchFamily="18" charset="0"/>
+                          </a:rPr>
+                          <m:t>2</m:t>
+                        </m:r>
+                      </m:sub>
+                    </m:sSub>
+                    <m:r>
+                      <a:rPr lang="en-US" sz="2400" b="0" i="1" smtClean="0">
+                        <a:latin typeface="Cambria Math" panose="02040503050406030204" pitchFamily="18" charset="0"/>
+                      </a:rPr>
+                      <m:t>,</m:t>
+                    </m:r>
+                  </m:oMath>
+                </a14:m>
+                <a:r>
+                  <a:rPr lang="en-US" sz="2400" dirty="0">
+                    <a:latin typeface="Times New Roman" panose="02020603050405020304" pitchFamily="18" charset="0"/>
+                    <a:cs typeface="Times New Roman" panose="02020603050405020304" pitchFamily="18" charset="0"/>
+                  </a:rPr>
+                  <a:t> </a:t>
+                </a:r>
+                <a14:m>
+                  <m:oMath xmlns:m="http://schemas.openxmlformats.org/officeDocument/2006/math">
+                    <m:sSub>
+                      <m:sSubPr>
+                        <m:ctrlPr>
+                          <a:rPr lang="en-US" sz="2400" i="1">
+                            <a:latin typeface="Cambria Math" panose="02040503050406030204" pitchFamily="18" charset="0"/>
+                          </a:rPr>
+                        </m:ctrlPr>
+                      </m:sSubPr>
+                      <m:e>
+                        <m:r>
+                          <a:rPr lang="en-US" sz="2400" i="1">
+                            <a:latin typeface="Cambria Math" panose="02040503050406030204" pitchFamily="18" charset="0"/>
+                          </a:rPr>
+                          <m:t> </m:t>
+                        </m:r>
+                        <m:r>
+                          <a:rPr lang="en-US" sz="2400" b="0" i="1" smtClean="0">
+                            <a:latin typeface="Cambria Math" panose="02040503050406030204" pitchFamily="18" charset="0"/>
+                          </a:rPr>
+                          <m:t>𝐼</m:t>
+                        </m:r>
+                      </m:e>
+                      <m:sub>
+                        <m:r>
+                          <a:rPr lang="en-US" sz="2400" b="0" i="1" smtClean="0">
+                            <a:latin typeface="Cambria Math" panose="02040503050406030204" pitchFamily="18" charset="0"/>
+                          </a:rPr>
+                          <m:t>2</m:t>
+                        </m:r>
+                      </m:sub>
+                    </m:sSub>
+                  </m:oMath>
+                </a14:m>
+                <a:endParaRPr lang="en-US" sz="2400" dirty="0">
+                  <a:latin typeface="Times New Roman" panose="02020603050405020304" pitchFamily="18" charset="0"/>
+                  <a:cs typeface="Times New Roman" panose="02020603050405020304" pitchFamily="18" charset="0"/>
+                </a:endParaRPr>
+              </a:p>
+            </p:txBody>
+          </p:sp>
+        </mc:Choice>
+        <mc:Fallback>
+          <p:sp>
+            <p:nvSpPr>
+              <p:cNvPr id="57" name="TextBox 56">
+                <a:extLst>
+                  <a:ext uri="{FF2B5EF4-FFF2-40B4-BE49-F238E27FC236}">
+                    <a16:creationId xmlns:a16="http://schemas.microsoft.com/office/drawing/2014/main" id="{6810C673-B812-044F-801C-22933DC37E7C}"/>
+                  </a:ext>
+                </a:extLst>
+              </p:cNvPr>
+              <p:cNvSpPr txBox="1">
+                <a:spLocks noRot="1" noChangeAspect="1" noMove="1" noResize="1" noEditPoints="1" noAdjustHandles="1" noChangeArrowheads="1" noChangeShapeType="1" noTextEdit="1"/>
+              </p:cNvSpPr>
+              <p:nvPr/>
+            </p:nvSpPr>
+            <p:spPr>
+              <a:xfrm>
+                <a:off x="8328454" y="3898558"/>
+                <a:ext cx="1383309" cy="369332"/>
+              </a:xfrm>
+              <a:prstGeom prst="rect">
+                <a:avLst/>
+              </a:prstGeom>
+              <a:blipFill>
+                <a:blip r:embed="rId12"/>
+                <a:stretch>
+                  <a:fillRect l="-5455" t="-27586" b="-51724"/>
+                </a:stretch>
+              </a:blipFill>
+            </p:spPr>
+            <p:txBody>
+              <a:bodyPr/>
+              <a:lstStyle/>
+              <a:p>
+                <a:r>
+                  <a:rPr lang="en-US">
+                    <a:noFill/>
+                  </a:rPr>
+                  <a:t> </a:t>
+                </a:r>
+              </a:p>
+            </p:txBody>
+          </p:sp>
+        </mc:Fallback>
+      </mc:AlternateContent>
+      <mc:AlternateContent xmlns:mc="http://schemas.openxmlformats.org/markup-compatibility/2006">
+        <mc:Choice xmlns:a14="http://schemas.microsoft.com/office/drawing/2010/main" Requires="a14">
+          <p:sp>
+            <p:nvSpPr>
+              <p:cNvPr id="58" name="TextBox 57">
+                <a:extLst>
+                  <a:ext uri="{FF2B5EF4-FFF2-40B4-BE49-F238E27FC236}">
+                    <a16:creationId xmlns:a16="http://schemas.microsoft.com/office/drawing/2014/main" id="{52B6F862-9F00-584B-A924-167E859D67E8}"/>
+                  </a:ext>
+                </a:extLst>
+              </p:cNvPr>
+              <p:cNvSpPr txBox="1"/>
+              <p:nvPr/>
+            </p:nvSpPr>
+            <p:spPr>
+              <a:xfrm>
+                <a:off x="9128050" y="2796196"/>
+                <a:ext cx="1383309" cy="369332"/>
+              </a:xfrm>
+              <a:prstGeom prst="rect">
+                <a:avLst/>
+              </a:prstGeom>
+              <a:noFill/>
+            </p:spPr>
+            <p:txBody>
+              <a:bodyPr wrap="square" lIns="0" tIns="0" rIns="0" bIns="0" rtlCol="0">
+                <a:spAutoFit/>
+              </a:bodyPr>
+              <a:lstStyle/>
+              <a:p>
+                <a14:m>
+                  <m:oMath xmlns:m="http://schemas.openxmlformats.org/officeDocument/2006/math">
+                    <m:sSub>
+                      <m:sSubPr>
+                        <m:ctrlPr>
+                          <a:rPr lang="en-US" sz="2400" i="1" smtClean="0">
+                            <a:latin typeface="Cambria Math" panose="02040503050406030204" pitchFamily="18" charset="0"/>
+                          </a:rPr>
+                        </m:ctrlPr>
+                      </m:sSubPr>
+                      <m:e>
+                        <m:r>
+                          <a:rPr lang="en-US" sz="2400" b="0" i="1" smtClean="0">
+                            <a:latin typeface="Cambria Math" panose="02040503050406030204" pitchFamily="18" charset="0"/>
+                          </a:rPr>
+                          <m:t>𝑚</m:t>
+                        </m:r>
+                      </m:e>
+                      <m:sub>
+                        <m:r>
+                          <a:rPr lang="en-US" sz="2400" b="0" i="1" smtClean="0">
+                            <a:latin typeface="Cambria Math" panose="02040503050406030204" pitchFamily="18" charset="0"/>
+                          </a:rPr>
+                          <m:t>3</m:t>
+                        </m:r>
+                      </m:sub>
+                    </m:sSub>
+                  </m:oMath>
+                </a14:m>
+                <a:r>
+                  <a:rPr lang="en-US" sz="2400" dirty="0">
+                    <a:latin typeface="Times New Roman" panose="02020603050405020304" pitchFamily="18" charset="0"/>
+                    <a:cs typeface="Times New Roman" panose="02020603050405020304" pitchFamily="18" charset="0"/>
+                  </a:rPr>
+                  <a:t>,</a:t>
+                </a:r>
+                <a14:m>
+                  <m:oMath xmlns:m="http://schemas.openxmlformats.org/officeDocument/2006/math">
+                    <m:sSub>
+                      <m:sSubPr>
+                        <m:ctrlPr>
+                          <a:rPr lang="en-US" sz="2400" i="1">
+                            <a:latin typeface="Cambria Math" panose="02040503050406030204" pitchFamily="18" charset="0"/>
+                          </a:rPr>
+                        </m:ctrlPr>
+                      </m:sSubPr>
+                      <m:e>
+                        <m:r>
+                          <a:rPr lang="en-US" sz="2400" b="0" i="1" smtClean="0">
+                            <a:latin typeface="Cambria Math" panose="02040503050406030204" pitchFamily="18" charset="0"/>
+                          </a:rPr>
+                          <m:t> </m:t>
+                        </m:r>
+                        <m:r>
+                          <a:rPr lang="en-US" sz="2400" b="0" i="1" smtClean="0">
+                            <a:latin typeface="Cambria Math" panose="02040503050406030204" pitchFamily="18" charset="0"/>
+                          </a:rPr>
+                          <m:t>𝑙</m:t>
+                        </m:r>
+                      </m:e>
+                      <m:sub>
+                        <m:r>
+                          <a:rPr lang="en-US" sz="2400" b="0" i="1" smtClean="0">
+                            <a:latin typeface="Cambria Math" panose="02040503050406030204" pitchFamily="18" charset="0"/>
+                          </a:rPr>
+                          <m:t>3</m:t>
+                        </m:r>
+                      </m:sub>
+                    </m:sSub>
+                    <m:r>
+                      <a:rPr lang="en-US" sz="2400" b="0" i="1" smtClean="0">
+                        <a:latin typeface="Cambria Math" panose="02040503050406030204" pitchFamily="18" charset="0"/>
+                      </a:rPr>
+                      <m:t>,</m:t>
+                    </m:r>
+                  </m:oMath>
+                </a14:m>
+                <a:r>
+                  <a:rPr lang="en-US" sz="2400" dirty="0">
+                    <a:latin typeface="Times New Roman" panose="02020603050405020304" pitchFamily="18" charset="0"/>
+                    <a:cs typeface="Times New Roman" panose="02020603050405020304" pitchFamily="18" charset="0"/>
+                  </a:rPr>
+                  <a:t> </a:t>
+                </a:r>
+                <a14:m>
+                  <m:oMath xmlns:m="http://schemas.openxmlformats.org/officeDocument/2006/math">
+                    <m:sSub>
+                      <m:sSubPr>
+                        <m:ctrlPr>
+                          <a:rPr lang="en-US" sz="2400" i="1">
+                            <a:latin typeface="Cambria Math" panose="02040503050406030204" pitchFamily="18" charset="0"/>
+                          </a:rPr>
+                        </m:ctrlPr>
+                      </m:sSubPr>
+                      <m:e>
+                        <m:r>
+                          <a:rPr lang="en-US" sz="2400" i="1">
+                            <a:latin typeface="Cambria Math" panose="02040503050406030204" pitchFamily="18" charset="0"/>
+                          </a:rPr>
+                          <m:t> </m:t>
+                        </m:r>
+                        <m:r>
+                          <a:rPr lang="en-US" sz="2400" b="0" i="1" smtClean="0">
+                            <a:latin typeface="Cambria Math" panose="02040503050406030204" pitchFamily="18" charset="0"/>
+                          </a:rPr>
+                          <m:t>𝐼</m:t>
+                        </m:r>
+                      </m:e>
+                      <m:sub>
+                        <m:r>
+                          <a:rPr lang="en-US" sz="2400" b="0" i="1" smtClean="0">
+                            <a:latin typeface="Cambria Math" panose="02040503050406030204" pitchFamily="18" charset="0"/>
+                          </a:rPr>
+                          <m:t>3</m:t>
+                        </m:r>
+                      </m:sub>
+                    </m:sSub>
+                  </m:oMath>
+                </a14:m>
+                <a:endParaRPr lang="en-US" sz="2400" dirty="0">
+                  <a:latin typeface="Times New Roman" panose="02020603050405020304" pitchFamily="18" charset="0"/>
+                  <a:cs typeface="Times New Roman" panose="02020603050405020304" pitchFamily="18" charset="0"/>
+                </a:endParaRPr>
+              </a:p>
+            </p:txBody>
+          </p:sp>
+        </mc:Choice>
+        <mc:Fallback>
+          <p:sp>
+            <p:nvSpPr>
+              <p:cNvPr id="58" name="TextBox 57">
+                <a:extLst>
+                  <a:ext uri="{FF2B5EF4-FFF2-40B4-BE49-F238E27FC236}">
+                    <a16:creationId xmlns:a16="http://schemas.microsoft.com/office/drawing/2014/main" id="{52B6F862-9F00-584B-A924-167E859D67E8}"/>
+                  </a:ext>
+                </a:extLst>
+              </p:cNvPr>
+              <p:cNvSpPr txBox="1">
+                <a:spLocks noRot="1" noChangeAspect="1" noMove="1" noResize="1" noEditPoints="1" noAdjustHandles="1" noChangeArrowheads="1" noChangeShapeType="1" noTextEdit="1"/>
+              </p:cNvSpPr>
+              <p:nvPr/>
+            </p:nvSpPr>
+            <p:spPr>
+              <a:xfrm>
+                <a:off x="9128050" y="2796196"/>
+                <a:ext cx="1383309" cy="369332"/>
+              </a:xfrm>
+              <a:prstGeom prst="rect">
+                <a:avLst/>
+              </a:prstGeom>
+              <a:blipFill>
+                <a:blip r:embed="rId13"/>
+                <a:stretch>
+                  <a:fillRect l="-5455" t="-26667" b="-46667"/>
+                </a:stretch>
+              </a:blipFill>
+            </p:spPr>
+            <p:txBody>
+              <a:bodyPr/>
+              <a:lstStyle/>
+              <a:p>
+                <a:r>
+                  <a:rPr lang="en-US">
+                    <a:noFill/>
+                  </a:rPr>
+                  <a:t> </a:t>
+                </a:r>
+              </a:p>
+            </p:txBody>
+          </p:sp>
+        </mc:Fallback>
+      </mc:AlternateContent>
+      <p:cxnSp>
+        <p:nvCxnSpPr>
+          <p:cNvPr id="60" name="Straight Connector 59">
+            <a:extLst>
+              <a:ext uri="{FF2B5EF4-FFF2-40B4-BE49-F238E27FC236}">
+                <a16:creationId xmlns:a16="http://schemas.microsoft.com/office/drawing/2014/main" id="{8054DFD6-3138-1742-BD20-102A93FCC655}"/>
+              </a:ext>
+            </a:extLst>
+          </p:cNvPr>
+          <p:cNvCxnSpPr>
+            <a:cxnSpLocks/>
+            <a:stCxn id="26" idx="4"/>
+          </p:cNvCxnSpPr>
+          <p:nvPr/>
+        </p:nvCxnSpPr>
+        <p:spPr>
+          <a:xfrm flipV="1">
+            <a:off x="10802884" y="1801269"/>
+            <a:ext cx="1110225" cy="494792"/>
+          </a:xfrm>
+          <a:prstGeom prst="line">
+            <a:avLst/>
+          </a:prstGeom>
+          <a:ln>
+            <a:solidFill>
+              <a:schemeClr val="tx1"/>
+            </a:solidFill>
+          </a:ln>
+        </p:spPr>
+        <p:style>
+          <a:lnRef idx="1">
+            <a:schemeClr val="accent1"/>
+          </a:lnRef>
+          <a:fillRef idx="0">
+            <a:schemeClr val="accent1"/>
+          </a:fillRef>
+          <a:effectRef idx="0">
+            <a:schemeClr val="accent1"/>
+          </a:effectRef>
+          <a:fontRef idx="minor">
+            <a:schemeClr val="tx1"/>
+          </a:fontRef>
+        </p:style>
+      </p:cxnSp>
+      <p:cxnSp>
+        <p:nvCxnSpPr>
+          <p:cNvPr id="62" name="Straight Connector 61">
+            <a:extLst>
+              <a:ext uri="{FF2B5EF4-FFF2-40B4-BE49-F238E27FC236}">
+                <a16:creationId xmlns:a16="http://schemas.microsoft.com/office/drawing/2014/main" id="{0106646E-88AF-2545-ADDE-254D877B092F}"/>
+              </a:ext>
+            </a:extLst>
+          </p:cNvPr>
+          <p:cNvCxnSpPr>
+            <a:cxnSpLocks/>
+          </p:cNvCxnSpPr>
+          <p:nvPr/>
+        </p:nvCxnSpPr>
+        <p:spPr>
+          <a:xfrm flipV="1">
+            <a:off x="10465680" y="989228"/>
+            <a:ext cx="1100632" cy="480562"/>
+          </a:xfrm>
+          <a:prstGeom prst="line">
+            <a:avLst/>
+          </a:prstGeom>
+          <a:ln>
+            <a:solidFill>
+              <a:schemeClr val="tx1"/>
+            </a:solidFill>
+          </a:ln>
+        </p:spPr>
+        <p:style>
+          <a:lnRef idx="1">
+            <a:schemeClr val="accent1"/>
+          </a:lnRef>
+          <a:fillRef idx="0">
+            <a:schemeClr val="accent1"/>
+          </a:fillRef>
+          <a:effectRef idx="0">
+            <a:schemeClr val="accent1"/>
+          </a:effectRef>
+          <a:fontRef idx="minor">
+            <a:schemeClr val="tx1"/>
+          </a:fontRef>
+        </p:style>
+      </p:cxnSp>
+      <p:cxnSp>
+        <p:nvCxnSpPr>
+          <p:cNvPr id="67" name="Straight Arrow Connector 66">
+            <a:extLst>
+              <a:ext uri="{FF2B5EF4-FFF2-40B4-BE49-F238E27FC236}">
+                <a16:creationId xmlns:a16="http://schemas.microsoft.com/office/drawing/2014/main" id="{559973B3-C6D7-264C-9B9E-D6366D455AFA}"/>
+              </a:ext>
+            </a:extLst>
+          </p:cNvPr>
+          <p:cNvCxnSpPr>
+            <a:cxnSpLocks/>
+          </p:cNvCxnSpPr>
+          <p:nvPr/>
+        </p:nvCxnSpPr>
+        <p:spPr>
+          <a:xfrm>
+            <a:off x="11389640" y="1214557"/>
+            <a:ext cx="294860" cy="606597"/>
+          </a:xfrm>
+          <a:prstGeom prst="straightConnector1">
+            <a:avLst/>
+          </a:prstGeom>
+          <a:ln>
+            <a:solidFill>
+              <a:schemeClr val="tx1"/>
+            </a:solidFill>
+            <a:headEnd type="triangle"/>
+            <a:tailEnd type="triangle"/>
+          </a:ln>
+        </p:spPr>
+        <p:style>
+          <a:lnRef idx="1">
+            <a:schemeClr val="accent1"/>
+          </a:lnRef>
+          <a:fillRef idx="0">
+            <a:schemeClr val="accent1"/>
+          </a:fillRef>
+          <a:effectRef idx="0">
+            <a:schemeClr val="accent1"/>
+          </a:effectRef>
+          <a:fontRef idx="minor">
+            <a:schemeClr val="tx1"/>
+          </a:fontRef>
+        </p:style>
+      </p:cxnSp>
+      <mc:AlternateContent xmlns:mc="http://schemas.openxmlformats.org/markup-compatibility/2006">
+        <mc:Choice xmlns:a14="http://schemas.microsoft.com/office/drawing/2010/main" Requires="a14">
+          <p:sp>
+            <p:nvSpPr>
+              <p:cNvPr id="70" name="TextBox 69">
+                <a:extLst>
+                  <a:ext uri="{FF2B5EF4-FFF2-40B4-BE49-F238E27FC236}">
+                    <a16:creationId xmlns:a16="http://schemas.microsoft.com/office/drawing/2014/main" id="{F0D96F8E-064E-6F4D-BF97-D9BE4CF52F8C}"/>
+                  </a:ext>
+                </a:extLst>
+              </p:cNvPr>
+              <p:cNvSpPr txBox="1"/>
+              <p:nvPr/>
+            </p:nvSpPr>
+            <p:spPr>
+              <a:xfrm>
+                <a:off x="11676818" y="1243309"/>
+                <a:ext cx="348508" cy="398955"/>
+              </a:xfrm>
+              <a:prstGeom prst="rect">
+                <a:avLst/>
+              </a:prstGeom>
+              <a:noFill/>
+            </p:spPr>
+            <p:txBody>
+              <a:bodyPr wrap="square" lIns="0" tIns="0" rIns="0" bIns="0" rtlCol="0">
+                <a:spAutoFit/>
+              </a:bodyPr>
+              <a:lstStyle/>
+              <a:p>
+                <a14:m>
+                  <m:oMathPara xmlns:m="http://schemas.openxmlformats.org/officeDocument/2006/math">
+                    <m:oMathParaPr>
+                      <m:jc m:val="centerGroup"/>
+                    </m:oMathParaPr>
+                    <m:oMath xmlns:m="http://schemas.openxmlformats.org/officeDocument/2006/math">
+                      <m:sSub>
+                        <m:sSubPr>
+                          <m:ctrlPr>
+                            <a:rPr lang="en-US" sz="2400" i="1" smtClean="0">
+                              <a:latin typeface="Cambria Math" panose="02040503050406030204" pitchFamily="18" charset="0"/>
+                            </a:rPr>
+                          </m:ctrlPr>
+                        </m:sSubPr>
+                        <m:e>
+                          <m:r>
+                            <a:rPr lang="en-US" sz="2400" b="0" i="1" smtClean="0">
+                              <a:latin typeface="Cambria Math" panose="02040503050406030204" pitchFamily="18" charset="0"/>
+                            </a:rPr>
+                            <m:t>𝑟</m:t>
+                          </m:r>
+                        </m:e>
+                        <m:sub>
+                          <m:r>
+                            <a:rPr lang="en-US" sz="2400" b="0" i="1" smtClean="0">
+                              <a:latin typeface="Cambria Math" panose="02040503050406030204" pitchFamily="18" charset="0"/>
+                            </a:rPr>
+                            <m:t>𝑓𝑟</m:t>
+                          </m:r>
+                        </m:sub>
+                      </m:sSub>
+                    </m:oMath>
+                  </m:oMathPara>
+                </a14:m>
+                <a:endParaRPr lang="en-US" sz="2400" dirty="0"/>
+              </a:p>
+            </p:txBody>
+          </p:sp>
+        </mc:Choice>
+        <mc:Fallback>
+          <p:sp>
+            <p:nvSpPr>
+              <p:cNvPr id="70" name="TextBox 69">
+                <a:extLst>
+                  <a:ext uri="{FF2B5EF4-FFF2-40B4-BE49-F238E27FC236}">
+                    <a16:creationId xmlns:a16="http://schemas.microsoft.com/office/drawing/2014/main" id="{F0D96F8E-064E-6F4D-BF97-D9BE4CF52F8C}"/>
+                  </a:ext>
+                </a:extLst>
+              </p:cNvPr>
+              <p:cNvSpPr txBox="1">
+                <a:spLocks noRot="1" noChangeAspect="1" noMove="1" noResize="1" noEditPoints="1" noAdjustHandles="1" noChangeArrowheads="1" noChangeShapeType="1" noTextEdit="1"/>
+              </p:cNvSpPr>
+              <p:nvPr/>
+            </p:nvSpPr>
+            <p:spPr>
+              <a:xfrm>
+                <a:off x="11676818" y="1243309"/>
+                <a:ext cx="348508" cy="398955"/>
+              </a:xfrm>
+              <a:prstGeom prst="rect">
+                <a:avLst/>
+              </a:prstGeom>
+              <a:blipFill>
+                <a:blip r:embed="rId14"/>
+                <a:stretch>
+                  <a:fillRect l="-20690" r="-24138" b="-27273"/>
+                </a:stretch>
+              </a:blipFill>
+            </p:spPr>
+            <p:txBody>
+              <a:bodyPr/>
+              <a:lstStyle/>
+              <a:p>
+                <a:r>
+                  <a:rPr lang="en-US">
+                    <a:noFill/>
+                  </a:rPr>
+                  <a:t> </a:t>
+                </a:r>
+              </a:p>
+            </p:txBody>
+          </p:sp>
+        </mc:Fallback>
+      </mc:AlternateContent>
     </p:spTree>
     <p:extLst>
       <p:ext uri="{BB962C8B-B14F-4D97-AF65-F5344CB8AC3E}">

</xml_diff>